<commit_message>
Update Proyecto Examen transversal.pptx
</commit_message>
<xml_diff>
--- a/Proyecto Examen transversal.pptx
+++ b/Proyecto Examen transversal.pptx
@@ -166,7 +166,7 @@
           <a:noFill/>
           <a:extLst>
             <a:ext uri="{909E8E84-426E-40dd-AFC4-6F175D3DCCD1}">
-              <a14:hiddenFill xmlns="" xmlns:a14="http://schemas.microsoft.com/office/drawing/2010/main">
+              <a14:hiddenFill xmlns:a14="http://schemas.microsoft.com/office/drawing/2010/main" xmlns="">
                 <a:solidFill>
                   <a:srgbClr val="FFFFFF"/>
                 </a:solidFill>
@@ -226,7 +226,7 @@
             </a:ln>
             <a:extLst>
               <a:ext uri="{91240B29-F687-4f45-9708-019B960494DF}">
-                <a14:hiddenLine xmlns="" xmlns:a14="http://schemas.microsoft.com/office/drawing/2010/main" w="9525">
+                <a14:hiddenLine xmlns:a14="http://schemas.microsoft.com/office/drawing/2010/main" xmlns="" w="9525">
                   <a:solidFill>
                     <a:srgbClr val="000000"/>
                   </a:solidFill>
@@ -316,7 +316,7 @@
             </a:ln>
             <a:extLst>
               <a:ext uri="{91240B29-F687-4f45-9708-019B960494DF}">
-                <a14:hiddenLine xmlns="" xmlns:a14="http://schemas.microsoft.com/office/drawing/2010/main" w="9525">
+                <a14:hiddenLine xmlns:a14="http://schemas.microsoft.com/office/drawing/2010/main" xmlns="" w="9525">
                   <a:solidFill>
                     <a:srgbClr val="000000"/>
                   </a:solidFill>
@@ -406,7 +406,7 @@
             </a:ln>
             <a:extLst>
               <a:ext uri="{91240B29-F687-4f45-9708-019B960494DF}">
-                <a14:hiddenLine xmlns="" xmlns:a14="http://schemas.microsoft.com/office/drawing/2010/main" w="9525">
+                <a14:hiddenLine xmlns:a14="http://schemas.microsoft.com/office/drawing/2010/main" xmlns="" w="9525">
                   <a:solidFill>
                     <a:srgbClr val="000000"/>
                   </a:solidFill>
@@ -440,7 +440,7 @@
             </a:ln>
             <a:extLst>
               <a:ext uri="{91240B29-F687-4f45-9708-019B960494DF}">
-                <a14:hiddenLine xmlns="" xmlns:a14="http://schemas.microsoft.com/office/drawing/2010/main" w="9525">
+                <a14:hiddenLine xmlns:a14="http://schemas.microsoft.com/office/drawing/2010/main" xmlns="" w="9525">
                   <a:solidFill>
                     <a:srgbClr val="000000"/>
                   </a:solidFill>
@@ -530,7 +530,7 @@
             </a:ln>
             <a:extLst>
               <a:ext uri="{91240B29-F687-4f45-9708-019B960494DF}">
-                <a14:hiddenLine xmlns="" xmlns:a14="http://schemas.microsoft.com/office/drawing/2010/main" w="9525">
+                <a14:hiddenLine xmlns:a14="http://schemas.microsoft.com/office/drawing/2010/main" xmlns="" w="9525">
                   <a:solidFill>
                     <a:srgbClr val="000000"/>
                   </a:solidFill>
@@ -592,7 +592,7 @@
             </a:ln>
             <a:extLst>
               <a:ext uri="{91240B29-F687-4f45-9708-019B960494DF}">
-                <a14:hiddenLine xmlns="" xmlns:a14="http://schemas.microsoft.com/office/drawing/2010/main" w="9525">
+                <a14:hiddenLine xmlns:a14="http://schemas.microsoft.com/office/drawing/2010/main" xmlns="" w="9525">
                   <a:solidFill>
                     <a:srgbClr val="000000"/>
                   </a:solidFill>
@@ -654,7 +654,7 @@
             </a:ln>
             <a:extLst>
               <a:ext uri="{91240B29-F687-4f45-9708-019B960494DF}">
-                <a14:hiddenLine xmlns="" xmlns:a14="http://schemas.microsoft.com/office/drawing/2010/main" w="9525">
+                <a14:hiddenLine xmlns:a14="http://schemas.microsoft.com/office/drawing/2010/main" xmlns="" w="9525">
                   <a:solidFill>
                     <a:srgbClr val="000000"/>
                   </a:solidFill>
@@ -744,7 +744,7 @@
             </a:ln>
             <a:extLst>
               <a:ext uri="{91240B29-F687-4f45-9708-019B960494DF}">
-                <a14:hiddenLine xmlns="" xmlns:a14="http://schemas.microsoft.com/office/drawing/2010/main" w="9525">
+                <a14:hiddenLine xmlns:a14="http://schemas.microsoft.com/office/drawing/2010/main" xmlns="" w="9525">
                   <a:solidFill>
                     <a:srgbClr val="000000"/>
                   </a:solidFill>
@@ -806,7 +806,7 @@
             </a:ln>
             <a:extLst>
               <a:ext uri="{91240B29-F687-4f45-9708-019B960494DF}">
-                <a14:hiddenLine xmlns="" xmlns:a14="http://schemas.microsoft.com/office/drawing/2010/main" w="9525">
+                <a14:hiddenLine xmlns:a14="http://schemas.microsoft.com/office/drawing/2010/main" xmlns="" w="9525">
                   <a:solidFill>
                     <a:srgbClr val="000000"/>
                   </a:solidFill>
@@ -868,7 +868,7 @@
             </a:ln>
             <a:extLst>
               <a:ext uri="{91240B29-F687-4f45-9708-019B960494DF}">
-                <a14:hiddenLine xmlns="" xmlns:a14="http://schemas.microsoft.com/office/drawing/2010/main" w="9525">
+                <a14:hiddenLine xmlns:a14="http://schemas.microsoft.com/office/drawing/2010/main" xmlns="" w="9525">
                   <a:solidFill>
                     <a:srgbClr val="000000"/>
                   </a:solidFill>
@@ -958,7 +958,7 @@
             </a:ln>
             <a:extLst>
               <a:ext uri="{91240B29-F687-4f45-9708-019B960494DF}">
-                <a14:hiddenLine xmlns="" xmlns:a14="http://schemas.microsoft.com/office/drawing/2010/main" w="9525">
+                <a14:hiddenLine xmlns:a14="http://schemas.microsoft.com/office/drawing/2010/main" xmlns="" w="9525">
                   <a:solidFill>
                     <a:srgbClr val="000000"/>
                   </a:solidFill>
@@ -1048,7 +1048,7 @@
             </a:ln>
             <a:extLst>
               <a:ext uri="{91240B29-F687-4f45-9708-019B960494DF}">
-                <a14:hiddenLine xmlns="" xmlns:a14="http://schemas.microsoft.com/office/drawing/2010/main" w="9525">
+                <a14:hiddenLine xmlns:a14="http://schemas.microsoft.com/office/drawing/2010/main" xmlns="" w="9525">
                   <a:solidFill>
                     <a:srgbClr val="000000"/>
                   </a:solidFill>
@@ -1110,7 +1110,7 @@
             </a:ln>
             <a:extLst>
               <a:ext uri="{91240B29-F687-4f45-9708-019B960494DF}">
-                <a14:hiddenLine xmlns="" xmlns:a14="http://schemas.microsoft.com/office/drawing/2010/main" w="9525">
+                <a14:hiddenLine xmlns:a14="http://schemas.microsoft.com/office/drawing/2010/main" xmlns="" w="9525">
                   <a:solidFill>
                     <a:srgbClr val="000000"/>
                   </a:solidFill>
@@ -1220,7 +1220,7 @@
             </a:ln>
             <a:extLst>
               <a:ext uri="{91240B29-F687-4f45-9708-019B960494DF}">
-                <a14:hiddenLine xmlns="" xmlns:a14="http://schemas.microsoft.com/office/drawing/2010/main" w="9525">
+                <a14:hiddenLine xmlns:a14="http://schemas.microsoft.com/office/drawing/2010/main" xmlns="" w="9525">
                   <a:solidFill>
                     <a:srgbClr val="000000"/>
                   </a:solidFill>
@@ -1282,7 +1282,7 @@
             </a:ln>
             <a:extLst>
               <a:ext uri="{91240B29-F687-4f45-9708-019B960494DF}">
-                <a14:hiddenLine xmlns="" xmlns:a14="http://schemas.microsoft.com/office/drawing/2010/main" w="9525">
+                <a14:hiddenLine xmlns:a14="http://schemas.microsoft.com/office/drawing/2010/main" xmlns="" w="9525">
                   <a:solidFill>
                     <a:srgbClr val="000000"/>
                   </a:solidFill>
@@ -1372,7 +1372,7 @@
             </a:ln>
             <a:extLst>
               <a:ext uri="{91240B29-F687-4f45-9708-019B960494DF}">
-                <a14:hiddenLine xmlns="" xmlns:a14="http://schemas.microsoft.com/office/drawing/2010/main" w="9525">
+                <a14:hiddenLine xmlns:a14="http://schemas.microsoft.com/office/drawing/2010/main" xmlns="" w="9525">
                   <a:solidFill>
                     <a:srgbClr val="000000"/>
                   </a:solidFill>
@@ -1462,7 +1462,7 @@
             </a:ln>
             <a:extLst>
               <a:ext uri="{91240B29-F687-4f45-9708-019B960494DF}">
-                <a14:hiddenLine xmlns="" xmlns:a14="http://schemas.microsoft.com/office/drawing/2010/main" w="9525">
+                <a14:hiddenLine xmlns:a14="http://schemas.microsoft.com/office/drawing/2010/main" xmlns="" w="9525">
                   <a:solidFill>
                     <a:srgbClr val="000000"/>
                   </a:solidFill>
@@ -1524,7 +1524,7 @@
             </a:ln>
             <a:extLst>
               <a:ext uri="{91240B29-F687-4f45-9708-019B960494DF}">
-                <a14:hiddenLine xmlns="" xmlns:a14="http://schemas.microsoft.com/office/drawing/2010/main" w="9525">
+                <a14:hiddenLine xmlns:a14="http://schemas.microsoft.com/office/drawing/2010/main" xmlns="" w="9525">
                   <a:solidFill>
                     <a:srgbClr val="000000"/>
                   </a:solidFill>
@@ -1614,7 +1614,7 @@
             </a:ln>
             <a:extLst>
               <a:ext uri="{91240B29-F687-4f45-9708-019B960494DF}">
-                <a14:hiddenLine xmlns="" xmlns:a14="http://schemas.microsoft.com/office/drawing/2010/main" w="9525">
+                <a14:hiddenLine xmlns:a14="http://schemas.microsoft.com/office/drawing/2010/main" xmlns="" w="9525">
                   <a:solidFill>
                     <a:srgbClr val="000000"/>
                   </a:solidFill>
@@ -1704,7 +1704,7 @@
             </a:ln>
             <a:extLst>
               <a:ext uri="{91240B29-F687-4f45-9708-019B960494DF}">
-                <a14:hiddenLine xmlns="" xmlns:a14="http://schemas.microsoft.com/office/drawing/2010/main" w="9525">
+                <a14:hiddenLine xmlns:a14="http://schemas.microsoft.com/office/drawing/2010/main" xmlns="" w="9525">
                   <a:solidFill>
                     <a:srgbClr val="000000"/>
                   </a:solidFill>
@@ -1760,7 +1760,7 @@
             </a:ln>
             <a:extLst>
               <a:ext uri="{91240B29-F687-4f45-9708-019B960494DF}">
-                <a14:hiddenLine xmlns="" xmlns:a14="http://schemas.microsoft.com/office/drawing/2010/main" w="9525">
+                <a14:hiddenLine xmlns:a14="http://schemas.microsoft.com/office/drawing/2010/main" xmlns="" w="9525">
                   <a:solidFill>
                     <a:srgbClr val="000000"/>
                   </a:solidFill>
@@ -1850,7 +1850,7 @@
             </a:ln>
             <a:extLst>
               <a:ext uri="{91240B29-F687-4f45-9708-019B960494DF}">
-                <a14:hiddenLine xmlns="" xmlns:a14="http://schemas.microsoft.com/office/drawing/2010/main" w="9525">
+                <a14:hiddenLine xmlns:a14="http://schemas.microsoft.com/office/drawing/2010/main" xmlns="" w="9525">
                   <a:solidFill>
                     <a:srgbClr val="000000"/>
                   </a:solidFill>
@@ -1906,7 +1906,7 @@
             </a:ln>
             <a:extLst>
               <a:ext uri="{91240B29-F687-4f45-9708-019B960494DF}">
-                <a14:hiddenLine xmlns="" xmlns:a14="http://schemas.microsoft.com/office/drawing/2010/main" w="9525">
+                <a14:hiddenLine xmlns:a14="http://schemas.microsoft.com/office/drawing/2010/main" xmlns="" w="9525">
                   <a:solidFill>
                     <a:srgbClr val="000000"/>
                   </a:solidFill>
@@ -1996,7 +1996,7 @@
             </a:ln>
             <a:extLst>
               <a:ext uri="{91240B29-F687-4f45-9708-019B960494DF}">
-                <a14:hiddenLine xmlns="" xmlns:a14="http://schemas.microsoft.com/office/drawing/2010/main" w="9525">
+                <a14:hiddenLine xmlns:a14="http://schemas.microsoft.com/office/drawing/2010/main" xmlns="" w="9525">
                   <a:solidFill>
                     <a:srgbClr val="000000"/>
                   </a:solidFill>
@@ -2064,7 +2064,7 @@
             </a:ln>
             <a:extLst>
               <a:ext uri="{91240B29-F687-4f45-9708-019B960494DF}">
-                <a14:hiddenLine xmlns="" xmlns:a14="http://schemas.microsoft.com/office/drawing/2010/main" w="9525">
+                <a14:hiddenLine xmlns:a14="http://schemas.microsoft.com/office/drawing/2010/main" xmlns="" w="9525">
                   <a:solidFill>
                     <a:srgbClr val="000000"/>
                   </a:solidFill>
@@ -2154,7 +2154,7 @@
             </a:ln>
             <a:extLst>
               <a:ext uri="{91240B29-F687-4f45-9708-019B960494DF}">
-                <a14:hiddenLine xmlns="" xmlns:a14="http://schemas.microsoft.com/office/drawing/2010/main" w="9525">
+                <a14:hiddenLine xmlns:a14="http://schemas.microsoft.com/office/drawing/2010/main" xmlns="" w="9525">
                   <a:solidFill>
                     <a:srgbClr val="000000"/>
                   </a:solidFill>
@@ -2222,7 +2222,7 @@
             </a:ln>
             <a:extLst>
               <a:ext uri="{91240B29-F687-4f45-9708-019B960494DF}">
-                <a14:hiddenLine xmlns="" xmlns:a14="http://schemas.microsoft.com/office/drawing/2010/main" w="9525">
+                <a14:hiddenLine xmlns:a14="http://schemas.microsoft.com/office/drawing/2010/main" xmlns="" w="9525">
                   <a:solidFill>
                     <a:srgbClr val="000000"/>
                   </a:solidFill>
@@ -2312,7 +2312,7 @@
             </a:ln>
             <a:extLst>
               <a:ext uri="{91240B29-F687-4f45-9708-019B960494DF}">
-                <a14:hiddenLine xmlns="" xmlns:a14="http://schemas.microsoft.com/office/drawing/2010/main" w="9525">
+                <a14:hiddenLine xmlns:a14="http://schemas.microsoft.com/office/drawing/2010/main" xmlns="" w="9525">
                   <a:solidFill>
                     <a:srgbClr val="000000"/>
                   </a:solidFill>
@@ -2346,7 +2346,7 @@
             </a:ln>
             <a:extLst>
               <a:ext uri="{91240B29-F687-4f45-9708-019B960494DF}">
-                <a14:hiddenLine xmlns="" xmlns:a14="http://schemas.microsoft.com/office/drawing/2010/main" w="9525">
+                <a14:hiddenLine xmlns:a14="http://schemas.microsoft.com/office/drawing/2010/main" xmlns="" w="9525">
                   <a:solidFill>
                     <a:srgbClr val="000000"/>
                   </a:solidFill>
@@ -2436,7 +2436,7 @@
             </a:ln>
             <a:extLst>
               <a:ext uri="{91240B29-F687-4f45-9708-019B960494DF}">
-                <a14:hiddenLine xmlns="" xmlns:a14="http://schemas.microsoft.com/office/drawing/2010/main" w="9525">
+                <a14:hiddenLine xmlns:a14="http://schemas.microsoft.com/office/drawing/2010/main" xmlns="" w="9525">
                   <a:solidFill>
                     <a:srgbClr val="000000"/>
                   </a:solidFill>
@@ -2498,7 +2498,7 @@
             </a:ln>
             <a:extLst>
               <a:ext uri="{91240B29-F687-4f45-9708-019B960494DF}">
-                <a14:hiddenLine xmlns="" xmlns:a14="http://schemas.microsoft.com/office/drawing/2010/main" w="9525">
+                <a14:hiddenLine xmlns:a14="http://schemas.microsoft.com/office/drawing/2010/main" xmlns="" w="9525">
                   <a:solidFill>
                     <a:srgbClr val="000000"/>
                   </a:solidFill>
@@ -2560,7 +2560,7 @@
             </a:ln>
             <a:extLst>
               <a:ext uri="{91240B29-F687-4f45-9708-019B960494DF}">
-                <a14:hiddenLine xmlns="" xmlns:a14="http://schemas.microsoft.com/office/drawing/2010/main" w="9525">
+                <a14:hiddenLine xmlns:a14="http://schemas.microsoft.com/office/drawing/2010/main" xmlns="" w="9525">
                   <a:solidFill>
                     <a:srgbClr val="000000"/>
                   </a:solidFill>
@@ -2650,7 +2650,7 @@
             </a:ln>
             <a:extLst>
               <a:ext uri="{91240B29-F687-4f45-9708-019B960494DF}">
-                <a14:hiddenLine xmlns="" xmlns:a14="http://schemas.microsoft.com/office/drawing/2010/main" w="9525">
+                <a14:hiddenLine xmlns:a14="http://schemas.microsoft.com/office/drawing/2010/main" xmlns="" w="9525">
                   <a:solidFill>
                     <a:srgbClr val="000000"/>
                   </a:solidFill>
@@ -2718,7 +2718,7 @@
             </a:ln>
             <a:extLst>
               <a:ext uri="{91240B29-F687-4f45-9708-019B960494DF}">
-                <a14:hiddenLine xmlns="" xmlns:a14="http://schemas.microsoft.com/office/drawing/2010/main" w="9525">
+                <a14:hiddenLine xmlns:a14="http://schemas.microsoft.com/office/drawing/2010/main" xmlns="" w="9525">
                   <a:solidFill>
                     <a:srgbClr val="000000"/>
                   </a:solidFill>
@@ -2780,7 +2780,7 @@
             </a:ln>
             <a:extLst>
               <a:ext uri="{91240B29-F687-4f45-9708-019B960494DF}">
-                <a14:hiddenLine xmlns="" xmlns:a14="http://schemas.microsoft.com/office/drawing/2010/main" w="9525">
+                <a14:hiddenLine xmlns:a14="http://schemas.microsoft.com/office/drawing/2010/main" xmlns="" w="9525">
                   <a:solidFill>
                     <a:srgbClr val="000000"/>
                   </a:solidFill>
@@ -2870,7 +2870,7 @@
             </a:ln>
             <a:extLst>
               <a:ext uri="{91240B29-F687-4f45-9708-019B960494DF}">
-                <a14:hiddenLine xmlns="" xmlns:a14="http://schemas.microsoft.com/office/drawing/2010/main" w="9525">
+                <a14:hiddenLine xmlns:a14="http://schemas.microsoft.com/office/drawing/2010/main" xmlns="" w="9525">
                   <a:solidFill>
                     <a:srgbClr val="000000"/>
                   </a:solidFill>
@@ -2932,7 +2932,7 @@
             </a:ln>
             <a:extLst>
               <a:ext uri="{91240B29-F687-4f45-9708-019B960494DF}">
-                <a14:hiddenLine xmlns="" xmlns:a14="http://schemas.microsoft.com/office/drawing/2010/main" w="9525">
+                <a14:hiddenLine xmlns:a14="http://schemas.microsoft.com/office/drawing/2010/main" xmlns="" w="9525">
                   <a:solidFill>
                     <a:srgbClr val="000000"/>
                   </a:solidFill>
@@ -3022,7 +3022,7 @@
             </a:ln>
             <a:extLst>
               <a:ext uri="{91240B29-F687-4f45-9708-019B960494DF}">
-                <a14:hiddenLine xmlns="" xmlns:a14="http://schemas.microsoft.com/office/drawing/2010/main" w="9525">
+                <a14:hiddenLine xmlns:a14="http://schemas.microsoft.com/office/drawing/2010/main" xmlns="" w="9525">
                   <a:solidFill>
                     <a:srgbClr val="000000"/>
                   </a:solidFill>
@@ -3084,7 +3084,7 @@
             </a:ln>
             <a:extLst>
               <a:ext uri="{91240B29-F687-4f45-9708-019B960494DF}">
-                <a14:hiddenLine xmlns="" xmlns:a14="http://schemas.microsoft.com/office/drawing/2010/main" w="9525">
+                <a14:hiddenLine xmlns:a14="http://schemas.microsoft.com/office/drawing/2010/main" xmlns="" w="9525">
                   <a:solidFill>
                     <a:srgbClr val="000000"/>
                   </a:solidFill>
@@ -3174,7 +3174,7 @@
             </a:ln>
             <a:extLst>
               <a:ext uri="{91240B29-F687-4f45-9708-019B960494DF}">
-                <a14:hiddenLine xmlns="" xmlns:a14="http://schemas.microsoft.com/office/drawing/2010/main" w="9525">
+                <a14:hiddenLine xmlns:a14="http://schemas.microsoft.com/office/drawing/2010/main" xmlns="" w="9525">
                   <a:solidFill>
                     <a:srgbClr val="000000"/>
                   </a:solidFill>
@@ -3208,7 +3208,7 @@
             </a:ln>
             <a:extLst>
               <a:ext uri="{91240B29-F687-4f45-9708-019B960494DF}">
-                <a14:hiddenLine xmlns="" xmlns:a14="http://schemas.microsoft.com/office/drawing/2010/main" w="9525">
+                <a14:hiddenLine xmlns:a14="http://schemas.microsoft.com/office/drawing/2010/main" xmlns="" w="9525">
                   <a:solidFill>
                     <a:srgbClr val="000000"/>
                   </a:solidFill>
@@ -3273,7 +3273,7 @@
             </a:ln>
             <a:extLst>
               <a:ext uri="{91240B29-F687-4f45-9708-019B960494DF}">
-                <a14:hiddenLine xmlns="" xmlns:a14="http://schemas.microsoft.com/office/drawing/2010/main" w="9525">
+                <a14:hiddenLine xmlns:a14="http://schemas.microsoft.com/office/drawing/2010/main" xmlns="" w="9525">
                   <a:solidFill>
                     <a:srgbClr val="000000"/>
                   </a:solidFill>
@@ -3363,7 +3363,7 @@
             </a:ln>
             <a:extLst>
               <a:ext uri="{91240B29-F687-4f45-9708-019B960494DF}">
-                <a14:hiddenLine xmlns="" xmlns:a14="http://schemas.microsoft.com/office/drawing/2010/main" w="9525">
+                <a14:hiddenLine xmlns:a14="http://schemas.microsoft.com/office/drawing/2010/main" xmlns="" w="9525">
                   <a:solidFill>
                     <a:srgbClr val="000000"/>
                   </a:solidFill>
@@ -3425,7 +3425,7 @@
             </a:ln>
             <a:extLst>
               <a:ext uri="{91240B29-F687-4f45-9708-019B960494DF}">
-                <a14:hiddenLine xmlns="" xmlns:a14="http://schemas.microsoft.com/office/drawing/2010/main" w="9525">
+                <a14:hiddenLine xmlns:a14="http://schemas.microsoft.com/office/drawing/2010/main" xmlns="" w="9525">
                   <a:solidFill>
                     <a:srgbClr val="000000"/>
                   </a:solidFill>
@@ -3515,7 +3515,7 @@
             </a:ln>
             <a:extLst>
               <a:ext uri="{91240B29-F687-4f45-9708-019B960494DF}">
-                <a14:hiddenLine xmlns="" xmlns:a14="http://schemas.microsoft.com/office/drawing/2010/main" w="9525">
+                <a14:hiddenLine xmlns:a14="http://schemas.microsoft.com/office/drawing/2010/main" xmlns="" w="9525">
                   <a:solidFill>
                     <a:srgbClr val="000000"/>
                   </a:solidFill>
@@ -3605,7 +3605,7 @@
             </a:ln>
             <a:extLst>
               <a:ext uri="{91240B29-F687-4f45-9708-019B960494DF}">
-                <a14:hiddenLine xmlns="" xmlns:a14="http://schemas.microsoft.com/office/drawing/2010/main" w="9525">
+                <a14:hiddenLine xmlns:a14="http://schemas.microsoft.com/office/drawing/2010/main" xmlns="" w="9525">
                   <a:solidFill>
                     <a:srgbClr val="000000"/>
                   </a:solidFill>
@@ -3670,7 +3670,7 @@
             </a:ln>
             <a:extLst>
               <a:ext uri="{91240B29-F687-4f45-9708-019B960494DF}">
-                <a14:hiddenLine xmlns="" xmlns:a14="http://schemas.microsoft.com/office/drawing/2010/main" w="9525">
+                <a14:hiddenLine xmlns:a14="http://schemas.microsoft.com/office/drawing/2010/main" xmlns="" w="9525">
                   <a:solidFill>
                     <a:srgbClr val="000000"/>
                   </a:solidFill>
@@ -3732,7 +3732,7 @@
             </a:ln>
             <a:extLst>
               <a:ext uri="{91240B29-F687-4f45-9708-019B960494DF}">
-                <a14:hiddenLine xmlns="" xmlns:a14="http://schemas.microsoft.com/office/drawing/2010/main" w="9525">
+                <a14:hiddenLine xmlns:a14="http://schemas.microsoft.com/office/drawing/2010/main" xmlns="" w="9525">
                   <a:solidFill>
                     <a:srgbClr val="000000"/>
                   </a:solidFill>
@@ -3822,7 +3822,7 @@
             </a:ln>
             <a:extLst>
               <a:ext uri="{91240B29-F687-4f45-9708-019B960494DF}">
-                <a14:hiddenLine xmlns="" xmlns:a14="http://schemas.microsoft.com/office/drawing/2010/main" w="9525">
+                <a14:hiddenLine xmlns:a14="http://schemas.microsoft.com/office/drawing/2010/main" xmlns="" w="9525">
                   <a:solidFill>
                     <a:srgbClr val="000000"/>
                   </a:solidFill>
@@ -3912,7 +3912,7 @@
             </a:ln>
             <a:extLst>
               <a:ext uri="{91240B29-F687-4f45-9708-019B960494DF}">
-                <a14:hiddenLine xmlns="" xmlns:a14="http://schemas.microsoft.com/office/drawing/2010/main" w="9525">
+                <a14:hiddenLine xmlns:a14="http://schemas.microsoft.com/office/drawing/2010/main" xmlns="" w="9525">
                   <a:solidFill>
                     <a:srgbClr val="000000"/>
                   </a:solidFill>
@@ -3974,7 +3974,7 @@
             </a:ln>
             <a:extLst>
               <a:ext uri="{91240B29-F687-4f45-9708-019B960494DF}">
-                <a14:hiddenLine xmlns="" xmlns:a14="http://schemas.microsoft.com/office/drawing/2010/main" w="9525">
+                <a14:hiddenLine xmlns:a14="http://schemas.microsoft.com/office/drawing/2010/main" xmlns="" w="9525">
                   <a:solidFill>
                     <a:srgbClr val="000000"/>
                   </a:solidFill>
@@ -4094,7 +4094,7 @@
             </a:ln>
             <a:extLst>
               <a:ext uri="{91240B29-F687-4f45-9708-019B960494DF}">
-                <a14:hiddenLine xmlns="" xmlns:a14="http://schemas.microsoft.com/office/drawing/2010/main" w="9525">
+                <a14:hiddenLine xmlns:a14="http://schemas.microsoft.com/office/drawing/2010/main" xmlns="" w="9525">
                   <a:solidFill>
                     <a:srgbClr val="000000"/>
                   </a:solidFill>
@@ -4162,7 +4162,7 @@
             </a:ln>
             <a:extLst>
               <a:ext uri="{91240B29-F687-4f45-9708-019B960494DF}">
-                <a14:hiddenLine xmlns="" xmlns:a14="http://schemas.microsoft.com/office/drawing/2010/main" w="9525">
+                <a14:hiddenLine xmlns:a14="http://schemas.microsoft.com/office/drawing/2010/main" xmlns="" w="9525">
                   <a:solidFill>
                     <a:srgbClr val="000000"/>
                   </a:solidFill>
@@ -4252,7 +4252,7 @@
             </a:ln>
             <a:extLst>
               <a:ext uri="{91240B29-F687-4f45-9708-019B960494DF}">
-                <a14:hiddenLine xmlns="" xmlns:a14="http://schemas.microsoft.com/office/drawing/2010/main" w="9525">
+                <a14:hiddenLine xmlns:a14="http://schemas.microsoft.com/office/drawing/2010/main" xmlns="" w="9525">
                   <a:solidFill>
                     <a:srgbClr val="000000"/>
                   </a:solidFill>
@@ -4392,7 +4392,7 @@
           <a:p>
             <a:fld id="{385B26FE-2E41-44AB-A29A-F73D389403F1}" type="datetimeFigureOut">
               <a:rPr lang="es-CL" smtClean="0"/>
-              <a:t>08-07-2022</a:t>
+              <a:t>09-07-2022</a:t>
             </a:fld>
             <a:endParaRPr lang="es-CL"/>
           </a:p>
@@ -4659,7 +4659,7 @@
           <a:p>
             <a:fld id="{385B26FE-2E41-44AB-A29A-F73D389403F1}" type="datetimeFigureOut">
               <a:rPr lang="es-CL" smtClean="0"/>
-              <a:t>08-07-2022</a:t>
+              <a:t>09-07-2022</a:t>
             </a:fld>
             <a:endParaRPr lang="es-CL"/>
           </a:p>
@@ -4855,7 +4855,7 @@
           <a:p>
             <a:fld id="{385B26FE-2E41-44AB-A29A-F73D389403F1}" type="datetimeFigureOut">
               <a:rPr lang="es-CL" smtClean="0"/>
-              <a:t>08-07-2022</a:t>
+              <a:t>09-07-2022</a:t>
             </a:fld>
             <a:endParaRPr lang="es-CL"/>
           </a:p>
@@ -5118,7 +5118,7 @@
           <a:p>
             <a:fld id="{385B26FE-2E41-44AB-A29A-F73D389403F1}" type="datetimeFigureOut">
               <a:rPr lang="es-CL" smtClean="0"/>
-              <a:t>08-07-2022</a:t>
+              <a:t>09-07-2022</a:t>
             </a:fld>
             <a:endParaRPr lang="es-CL"/>
           </a:p>
@@ -5552,7 +5552,7 @@
           <a:p>
             <a:fld id="{385B26FE-2E41-44AB-A29A-F73D389403F1}" type="datetimeFigureOut">
               <a:rPr lang="es-CL" smtClean="0"/>
-              <a:t>08-07-2022</a:t>
+              <a:t>09-07-2022</a:t>
             </a:fld>
             <a:endParaRPr lang="es-CL"/>
           </a:p>
@@ -6098,7 +6098,7 @@
           <a:p>
             <a:fld id="{385B26FE-2E41-44AB-A29A-F73D389403F1}" type="datetimeFigureOut">
               <a:rPr lang="es-CL" smtClean="0"/>
-              <a:t>08-07-2022</a:t>
+              <a:t>09-07-2022</a:t>
             </a:fld>
             <a:endParaRPr lang="es-CL"/>
           </a:p>
@@ -6818,7 +6818,7 @@
           <a:p>
             <a:fld id="{385B26FE-2E41-44AB-A29A-F73D389403F1}" type="datetimeFigureOut">
               <a:rPr lang="es-CL" smtClean="0"/>
-              <a:t>08-07-2022</a:t>
+              <a:t>09-07-2022</a:t>
             </a:fld>
             <a:endParaRPr lang="es-CL"/>
           </a:p>
@@ -6988,7 +6988,7 @@
           <a:p>
             <a:fld id="{385B26FE-2E41-44AB-A29A-F73D389403F1}" type="datetimeFigureOut">
               <a:rPr lang="es-CL" smtClean="0"/>
-              <a:t>08-07-2022</a:t>
+              <a:t>09-07-2022</a:t>
             </a:fld>
             <a:endParaRPr lang="es-CL"/>
           </a:p>
@@ -7168,7 +7168,7 @@
           <a:p>
             <a:fld id="{385B26FE-2E41-44AB-A29A-F73D389403F1}" type="datetimeFigureOut">
               <a:rPr lang="es-CL" smtClean="0"/>
-              <a:t>08-07-2022</a:t>
+              <a:t>09-07-2022</a:t>
             </a:fld>
             <a:endParaRPr lang="es-CL"/>
           </a:p>
@@ -7338,7 +7338,7 @@
           <a:p>
             <a:fld id="{385B26FE-2E41-44AB-A29A-F73D389403F1}" type="datetimeFigureOut">
               <a:rPr lang="es-CL" smtClean="0"/>
-              <a:t>08-07-2022</a:t>
+              <a:t>09-07-2022</a:t>
             </a:fld>
             <a:endParaRPr lang="es-CL"/>
           </a:p>
@@ -7588,7 +7588,7 @@
           <a:p>
             <a:fld id="{385B26FE-2E41-44AB-A29A-F73D389403F1}" type="datetimeFigureOut">
               <a:rPr lang="es-CL" smtClean="0"/>
-              <a:t>08-07-2022</a:t>
+              <a:t>09-07-2022</a:t>
             </a:fld>
             <a:endParaRPr lang="es-CL"/>
           </a:p>
@@ -7820,7 +7820,7 @@
           <a:p>
             <a:fld id="{385B26FE-2E41-44AB-A29A-F73D389403F1}" type="datetimeFigureOut">
               <a:rPr lang="es-CL" smtClean="0"/>
-              <a:t>08-07-2022</a:t>
+              <a:t>09-07-2022</a:t>
             </a:fld>
             <a:endParaRPr lang="es-CL"/>
           </a:p>
@@ -8201,7 +8201,7 @@
           <a:p>
             <a:fld id="{385B26FE-2E41-44AB-A29A-F73D389403F1}" type="datetimeFigureOut">
               <a:rPr lang="es-CL" smtClean="0"/>
-              <a:t>08-07-2022</a:t>
+              <a:t>09-07-2022</a:t>
             </a:fld>
             <a:endParaRPr lang="es-CL"/>
           </a:p>
@@ -8319,7 +8319,7 @@
           <a:p>
             <a:fld id="{385B26FE-2E41-44AB-A29A-F73D389403F1}" type="datetimeFigureOut">
               <a:rPr lang="es-CL" smtClean="0"/>
-              <a:t>08-07-2022</a:t>
+              <a:t>09-07-2022</a:t>
             </a:fld>
             <a:endParaRPr lang="es-CL"/>
           </a:p>
@@ -8414,7 +8414,7 @@
           <a:p>
             <a:fld id="{385B26FE-2E41-44AB-A29A-F73D389403F1}" type="datetimeFigureOut">
               <a:rPr lang="es-CL" smtClean="0"/>
-              <a:t>08-07-2022</a:t>
+              <a:t>09-07-2022</a:t>
             </a:fld>
             <a:endParaRPr lang="es-CL"/>
           </a:p>
@@ -8663,7 +8663,7 @@
           <a:p>
             <a:fld id="{385B26FE-2E41-44AB-A29A-F73D389403F1}" type="datetimeFigureOut">
               <a:rPr lang="es-CL" smtClean="0"/>
-              <a:t>08-07-2022</a:t>
+              <a:t>09-07-2022</a:t>
             </a:fld>
             <a:endParaRPr lang="es-CL"/>
           </a:p>
@@ -8943,7 +8943,7 @@
           <a:p>
             <a:fld id="{385B26FE-2E41-44AB-A29A-F73D389403F1}" type="datetimeFigureOut">
               <a:rPr lang="es-CL" smtClean="0"/>
-              <a:t>08-07-2022</a:t>
+              <a:t>09-07-2022</a:t>
             </a:fld>
             <a:endParaRPr lang="es-CL"/>
           </a:p>
@@ -9059,7 +9059,7 @@
           <a:noFill/>
           <a:extLst>
             <a:ext uri="{909E8E84-426E-40dd-AFC4-6F175D3DCCD1}">
-              <a14:hiddenFill xmlns="" xmlns:a14="http://schemas.microsoft.com/office/drawing/2010/main">
+              <a14:hiddenFill xmlns:a14="http://schemas.microsoft.com/office/drawing/2010/main" xmlns="">
                 <a:solidFill>
                   <a:srgbClr val="FFFFFF"/>
                 </a:solidFill>
@@ -9133,7 +9133,7 @@
               </a:ln>
               <a:extLst>
                 <a:ext uri="{91240B29-F687-4f45-9708-019B960494DF}">
-                  <a14:hiddenLine xmlns="" xmlns:a14="http://schemas.microsoft.com/office/drawing/2010/main" w="9525">
+                  <a14:hiddenLine xmlns:a14="http://schemas.microsoft.com/office/drawing/2010/main" xmlns="" w="9525">
                     <a:solidFill>
                       <a:srgbClr val="000000"/>
                     </a:solidFill>
@@ -9223,7 +9223,7 @@
               </a:ln>
               <a:extLst>
                 <a:ext uri="{91240B29-F687-4f45-9708-019B960494DF}">
-                  <a14:hiddenLine xmlns="" xmlns:a14="http://schemas.microsoft.com/office/drawing/2010/main" w="9525">
+                  <a14:hiddenLine xmlns:a14="http://schemas.microsoft.com/office/drawing/2010/main" xmlns="" w="9525">
                     <a:solidFill>
                       <a:srgbClr val="000000"/>
                     </a:solidFill>
@@ -9313,7 +9313,7 @@
               </a:ln>
               <a:extLst>
                 <a:ext uri="{91240B29-F687-4f45-9708-019B960494DF}">
-                  <a14:hiddenLine xmlns="" xmlns:a14="http://schemas.microsoft.com/office/drawing/2010/main" w="9525">
+                  <a14:hiddenLine xmlns:a14="http://schemas.microsoft.com/office/drawing/2010/main" xmlns="" w="9525">
                     <a:solidFill>
                       <a:srgbClr val="000000"/>
                     </a:solidFill>
@@ -9375,7 +9375,7 @@
               </a:ln>
               <a:extLst>
                 <a:ext uri="{91240B29-F687-4f45-9708-019B960494DF}">
-                  <a14:hiddenLine xmlns="" xmlns:a14="http://schemas.microsoft.com/office/drawing/2010/main" w="9525">
+                  <a14:hiddenLine xmlns:a14="http://schemas.microsoft.com/office/drawing/2010/main" xmlns="" w="9525">
                     <a:solidFill>
                       <a:srgbClr val="000000"/>
                     </a:solidFill>
@@ -9465,7 +9465,7 @@
               </a:ln>
               <a:extLst>
                 <a:ext uri="{91240B29-F687-4f45-9708-019B960494DF}">
-                  <a14:hiddenLine xmlns="" xmlns:a14="http://schemas.microsoft.com/office/drawing/2010/main" w="9525">
+                  <a14:hiddenLine xmlns:a14="http://schemas.microsoft.com/office/drawing/2010/main" xmlns="" w="9525">
                     <a:solidFill>
                       <a:srgbClr val="000000"/>
                     </a:solidFill>
@@ -9527,7 +9527,7 @@
               </a:ln>
               <a:extLst>
                 <a:ext uri="{91240B29-F687-4f45-9708-019B960494DF}">
-                  <a14:hiddenLine xmlns="" xmlns:a14="http://schemas.microsoft.com/office/drawing/2010/main" w="9525">
+                  <a14:hiddenLine xmlns:a14="http://schemas.microsoft.com/office/drawing/2010/main" xmlns="" w="9525">
                     <a:solidFill>
                       <a:srgbClr val="000000"/>
                     </a:solidFill>
@@ -9589,7 +9589,7 @@
               </a:ln>
               <a:extLst>
                 <a:ext uri="{91240B29-F687-4f45-9708-019B960494DF}">
-                  <a14:hiddenLine xmlns="" xmlns:a14="http://schemas.microsoft.com/office/drawing/2010/main" w="9525">
+                  <a14:hiddenLine xmlns:a14="http://schemas.microsoft.com/office/drawing/2010/main" xmlns="" w="9525">
                     <a:solidFill>
                       <a:srgbClr val="000000"/>
                     </a:solidFill>
@@ -9679,7 +9679,7 @@
               </a:ln>
               <a:extLst>
                 <a:ext uri="{91240B29-F687-4f45-9708-019B960494DF}">
-                  <a14:hiddenLine xmlns="" xmlns:a14="http://schemas.microsoft.com/office/drawing/2010/main" w="9525">
+                  <a14:hiddenLine xmlns:a14="http://schemas.microsoft.com/office/drawing/2010/main" xmlns="" w="9525">
                     <a:solidFill>
                       <a:srgbClr val="000000"/>
                     </a:solidFill>
@@ -9769,7 +9769,7 @@
               </a:ln>
               <a:extLst>
                 <a:ext uri="{91240B29-F687-4f45-9708-019B960494DF}">
-                  <a14:hiddenLine xmlns="" xmlns:a14="http://schemas.microsoft.com/office/drawing/2010/main" w="9525">
+                  <a14:hiddenLine xmlns:a14="http://schemas.microsoft.com/office/drawing/2010/main" xmlns="" w="9525">
                     <a:solidFill>
                       <a:srgbClr val="000000"/>
                     </a:solidFill>
@@ -9831,7 +9831,7 @@
               </a:ln>
               <a:extLst>
                 <a:ext uri="{91240B29-F687-4f45-9708-019B960494DF}">
-                  <a14:hiddenLine xmlns="" xmlns:a14="http://schemas.microsoft.com/office/drawing/2010/main" w="9525">
+                  <a14:hiddenLine xmlns:a14="http://schemas.microsoft.com/office/drawing/2010/main" xmlns="" w="9525">
                     <a:solidFill>
                       <a:srgbClr val="000000"/>
                     </a:solidFill>
@@ -9941,7 +9941,7 @@
               </a:ln>
               <a:extLst>
                 <a:ext uri="{91240B29-F687-4f45-9708-019B960494DF}">
-                  <a14:hiddenLine xmlns="" xmlns:a14="http://schemas.microsoft.com/office/drawing/2010/main" w="9525">
+                  <a14:hiddenLine xmlns:a14="http://schemas.microsoft.com/office/drawing/2010/main" xmlns="" w="9525">
                     <a:solidFill>
                       <a:srgbClr val="000000"/>
                     </a:solidFill>
@@ -10025,7 +10025,7 @@
               </a:ln>
               <a:extLst>
                 <a:ext uri="{91240B29-F687-4f45-9708-019B960494DF}">
-                  <a14:hiddenLine xmlns="" xmlns:a14="http://schemas.microsoft.com/office/drawing/2010/main" w="9525">
+                  <a14:hiddenLine xmlns:a14="http://schemas.microsoft.com/office/drawing/2010/main" xmlns="" w="9525">
                     <a:solidFill>
                       <a:srgbClr val="000000"/>
                     </a:solidFill>
@@ -10087,7 +10087,7 @@
               </a:ln>
               <a:extLst>
                 <a:ext uri="{91240B29-F687-4f45-9708-019B960494DF}">
-                  <a14:hiddenLine xmlns="" xmlns:a14="http://schemas.microsoft.com/office/drawing/2010/main" w="9525">
+                  <a14:hiddenLine xmlns:a14="http://schemas.microsoft.com/office/drawing/2010/main" xmlns="" w="9525">
                     <a:solidFill>
                       <a:srgbClr val="000000"/>
                     </a:solidFill>
@@ -10149,7 +10149,7 @@
               </a:ln>
               <a:extLst>
                 <a:ext uri="{91240B29-F687-4f45-9708-019B960494DF}">
-                  <a14:hiddenLine xmlns="" xmlns:a14="http://schemas.microsoft.com/office/drawing/2010/main" w="9525">
+                  <a14:hiddenLine xmlns:a14="http://schemas.microsoft.com/office/drawing/2010/main" xmlns="" w="9525">
                     <a:solidFill>
                       <a:srgbClr val="000000"/>
                     </a:solidFill>
@@ -10239,7 +10239,7 @@
               </a:ln>
               <a:extLst>
                 <a:ext uri="{91240B29-F687-4f45-9708-019B960494DF}">
-                  <a14:hiddenLine xmlns="" xmlns:a14="http://schemas.microsoft.com/office/drawing/2010/main" w="9525">
+                  <a14:hiddenLine xmlns:a14="http://schemas.microsoft.com/office/drawing/2010/main" xmlns="" w="9525">
                     <a:solidFill>
                       <a:srgbClr val="000000"/>
                     </a:solidFill>
@@ -10273,7 +10273,7 @@
               </a:ln>
               <a:extLst>
                 <a:ext uri="{91240B29-F687-4f45-9708-019B960494DF}">
-                  <a14:hiddenLine xmlns="" xmlns:a14="http://schemas.microsoft.com/office/drawing/2010/main" w="9525">
+                  <a14:hiddenLine xmlns:a14="http://schemas.microsoft.com/office/drawing/2010/main" xmlns="" w="9525">
                     <a:solidFill>
                       <a:srgbClr val="000000"/>
                     </a:solidFill>
@@ -10338,7 +10338,7 @@
               </a:ln>
               <a:extLst>
                 <a:ext uri="{91240B29-F687-4f45-9708-019B960494DF}">
-                  <a14:hiddenLine xmlns="" xmlns:a14="http://schemas.microsoft.com/office/drawing/2010/main" w="9525">
+                  <a14:hiddenLine xmlns:a14="http://schemas.microsoft.com/office/drawing/2010/main" xmlns="" w="9525">
                     <a:solidFill>
                       <a:srgbClr val="000000"/>
                     </a:solidFill>
@@ -10428,7 +10428,7 @@
               </a:ln>
               <a:extLst>
                 <a:ext uri="{91240B29-F687-4f45-9708-019B960494DF}">
-                  <a14:hiddenLine xmlns="" xmlns:a14="http://schemas.microsoft.com/office/drawing/2010/main" w="9525">
+                  <a14:hiddenLine xmlns:a14="http://schemas.microsoft.com/office/drawing/2010/main" xmlns="" w="9525">
                     <a:solidFill>
                       <a:srgbClr val="000000"/>
                     </a:solidFill>
@@ -10490,7 +10490,7 @@
               </a:ln>
               <a:extLst>
                 <a:ext uri="{91240B29-F687-4f45-9708-019B960494DF}">
-                  <a14:hiddenLine xmlns="" xmlns:a14="http://schemas.microsoft.com/office/drawing/2010/main" w="9525">
+                  <a14:hiddenLine xmlns:a14="http://schemas.microsoft.com/office/drawing/2010/main" xmlns="" w="9525">
                     <a:solidFill>
                       <a:srgbClr val="000000"/>
                     </a:solidFill>
@@ -10580,7 +10580,7 @@
               </a:ln>
               <a:extLst>
                 <a:ext uri="{91240B29-F687-4f45-9708-019B960494DF}">
-                  <a14:hiddenLine xmlns="" xmlns:a14="http://schemas.microsoft.com/office/drawing/2010/main" w="9525">
+                  <a14:hiddenLine xmlns:a14="http://schemas.microsoft.com/office/drawing/2010/main" xmlns="" w="9525">
                     <a:solidFill>
                       <a:srgbClr val="000000"/>
                     </a:solidFill>
@@ -10645,7 +10645,7 @@
               </a:ln>
               <a:extLst>
                 <a:ext uri="{91240B29-F687-4f45-9708-019B960494DF}">
-                  <a14:hiddenLine xmlns="" xmlns:a14="http://schemas.microsoft.com/office/drawing/2010/main" w="9525">
+                  <a14:hiddenLine xmlns:a14="http://schemas.microsoft.com/office/drawing/2010/main" xmlns="" w="9525">
                     <a:solidFill>
                       <a:srgbClr val="000000"/>
                     </a:solidFill>
@@ -10707,7 +10707,7 @@
               </a:ln>
               <a:extLst>
                 <a:ext uri="{91240B29-F687-4f45-9708-019B960494DF}">
-                  <a14:hiddenLine xmlns="" xmlns:a14="http://schemas.microsoft.com/office/drawing/2010/main" w="9525">
+                  <a14:hiddenLine xmlns:a14="http://schemas.microsoft.com/office/drawing/2010/main" xmlns="" w="9525">
                     <a:solidFill>
                       <a:srgbClr val="000000"/>
                     </a:solidFill>
@@ -10797,7 +10797,7 @@
               </a:ln>
               <a:extLst>
                 <a:ext uri="{91240B29-F687-4f45-9708-019B960494DF}">
-                  <a14:hiddenLine xmlns="" xmlns:a14="http://schemas.microsoft.com/office/drawing/2010/main" w="9525">
+                  <a14:hiddenLine xmlns:a14="http://schemas.microsoft.com/office/drawing/2010/main" xmlns="" w="9525">
                     <a:solidFill>
                       <a:srgbClr val="000000"/>
                     </a:solidFill>
@@ -10887,7 +10887,7 @@
               </a:ln>
               <a:extLst>
                 <a:ext uri="{91240B29-F687-4f45-9708-019B960494DF}">
-                  <a14:hiddenLine xmlns="" xmlns:a14="http://schemas.microsoft.com/office/drawing/2010/main" w="9525">
+                  <a14:hiddenLine xmlns:a14="http://schemas.microsoft.com/office/drawing/2010/main" xmlns="" w="9525">
                     <a:solidFill>
                       <a:srgbClr val="000000"/>
                     </a:solidFill>
@@ -10952,7 +10952,7 @@
               </a:ln>
               <a:extLst>
                 <a:ext uri="{91240B29-F687-4f45-9708-019B960494DF}">
-                  <a14:hiddenLine xmlns="" xmlns:a14="http://schemas.microsoft.com/office/drawing/2010/main" w="9525">
+                  <a14:hiddenLine xmlns:a14="http://schemas.microsoft.com/office/drawing/2010/main" xmlns="" w="9525">
                     <a:solidFill>
                       <a:srgbClr val="000000"/>
                     </a:solidFill>
@@ -11072,7 +11072,7 @@
               </a:ln>
               <a:extLst>
                 <a:ext uri="{91240B29-F687-4f45-9708-019B960494DF}">
-                  <a14:hiddenLine xmlns="" xmlns:a14="http://schemas.microsoft.com/office/drawing/2010/main" w="9525">
+                  <a14:hiddenLine xmlns:a14="http://schemas.microsoft.com/office/drawing/2010/main" xmlns="" w="9525">
                     <a:solidFill>
                       <a:srgbClr val="000000"/>
                     </a:solidFill>
@@ -11170,7 +11170,7 @@
               </a:ln>
               <a:extLst>
                 <a:ext uri="{91240B29-F687-4f45-9708-019B960494DF}">
-                  <a14:hiddenLine xmlns="" xmlns:a14="http://schemas.microsoft.com/office/drawing/2010/main" w="9525">
+                  <a14:hiddenLine xmlns:a14="http://schemas.microsoft.com/office/drawing/2010/main" xmlns="" w="9525">
                     <a:solidFill>
                       <a:srgbClr val="000000"/>
                     </a:solidFill>
@@ -11285,7 +11285,7 @@
               </a:ln>
               <a:extLst>
                 <a:ext uri="{91240B29-F687-4f45-9708-019B960494DF}">
-                  <a14:hiddenLine xmlns="" xmlns:a14="http://schemas.microsoft.com/office/drawing/2010/main" w="9525">
+                  <a14:hiddenLine xmlns:a14="http://schemas.microsoft.com/office/drawing/2010/main" xmlns="" w="9525">
                     <a:solidFill>
                       <a:srgbClr val="000000"/>
                     </a:solidFill>
@@ -11375,7 +11375,7 @@
               </a:ln>
               <a:extLst>
                 <a:ext uri="{91240B29-F687-4f45-9708-019B960494DF}">
-                  <a14:hiddenLine xmlns="" xmlns:a14="http://schemas.microsoft.com/office/drawing/2010/main" w="9525">
+                  <a14:hiddenLine xmlns:a14="http://schemas.microsoft.com/office/drawing/2010/main" xmlns="" w="9525">
                     <a:solidFill>
                       <a:srgbClr val="000000"/>
                     </a:solidFill>
@@ -11440,7 +11440,7 @@
               </a:ln>
               <a:extLst>
                 <a:ext uri="{91240B29-F687-4f45-9708-019B960494DF}">
-                  <a14:hiddenLine xmlns="" xmlns:a14="http://schemas.microsoft.com/office/drawing/2010/main" w="9525">
+                  <a14:hiddenLine xmlns:a14="http://schemas.microsoft.com/office/drawing/2010/main" xmlns="" w="9525">
                     <a:solidFill>
                       <a:srgbClr val="000000"/>
                     </a:solidFill>
@@ -11530,7 +11530,7 @@
               </a:ln>
               <a:extLst>
                 <a:ext uri="{91240B29-F687-4f45-9708-019B960494DF}">
-                  <a14:hiddenLine xmlns="" xmlns:a14="http://schemas.microsoft.com/office/drawing/2010/main" w="9525">
+                  <a14:hiddenLine xmlns:a14="http://schemas.microsoft.com/office/drawing/2010/main" xmlns="" w="9525">
                     <a:solidFill>
                       <a:srgbClr val="000000"/>
                     </a:solidFill>
@@ -11598,7 +11598,7 @@
               </a:ln>
               <a:extLst>
                 <a:ext uri="{91240B29-F687-4f45-9708-019B960494DF}">
-                  <a14:hiddenLine xmlns="" xmlns:a14="http://schemas.microsoft.com/office/drawing/2010/main" w="9525">
+                  <a14:hiddenLine xmlns:a14="http://schemas.microsoft.com/office/drawing/2010/main" xmlns="" w="9525">
                     <a:solidFill>
                       <a:srgbClr val="000000"/>
                     </a:solidFill>
@@ -11688,7 +11688,7 @@
               </a:ln>
               <a:extLst>
                 <a:ext uri="{91240B29-F687-4f45-9708-019B960494DF}">
-                  <a14:hiddenLine xmlns="" xmlns:a14="http://schemas.microsoft.com/office/drawing/2010/main" w="9525">
+                  <a14:hiddenLine xmlns:a14="http://schemas.microsoft.com/office/drawing/2010/main" xmlns="" w="9525">
                     <a:solidFill>
                       <a:srgbClr val="000000"/>
                     </a:solidFill>
@@ -11756,7 +11756,7 @@
               </a:ln>
               <a:extLst>
                 <a:ext uri="{91240B29-F687-4f45-9708-019B960494DF}">
-                  <a14:hiddenLine xmlns="" xmlns:a14="http://schemas.microsoft.com/office/drawing/2010/main" w="9525">
+                  <a14:hiddenLine xmlns:a14="http://schemas.microsoft.com/office/drawing/2010/main" xmlns="" w="9525">
                     <a:solidFill>
                       <a:srgbClr val="000000"/>
                     </a:solidFill>
@@ -11846,7 +11846,7 @@
               </a:ln>
               <a:extLst>
                 <a:ext uri="{91240B29-F687-4f45-9708-019B960494DF}">
-                  <a14:hiddenLine xmlns="" xmlns:a14="http://schemas.microsoft.com/office/drawing/2010/main" w="9525">
+                  <a14:hiddenLine xmlns:a14="http://schemas.microsoft.com/office/drawing/2010/main" xmlns="" w="9525">
                     <a:solidFill>
                       <a:srgbClr val="000000"/>
                     </a:solidFill>
@@ -11880,7 +11880,7 @@
               </a:ln>
               <a:extLst>
                 <a:ext uri="{91240B29-F687-4f45-9708-019B960494DF}">
-                  <a14:hiddenLine xmlns="" xmlns:a14="http://schemas.microsoft.com/office/drawing/2010/main" w="9525">
+                  <a14:hiddenLine xmlns:a14="http://schemas.microsoft.com/office/drawing/2010/main" xmlns="" w="9525">
                     <a:solidFill>
                       <a:srgbClr val="000000"/>
                     </a:solidFill>
@@ -12020,7 +12020,7 @@
           <a:p>
             <a:fld id="{385B26FE-2E41-44AB-A29A-F73D389403F1}" type="datetimeFigureOut">
               <a:rPr lang="es-CL" smtClean="0"/>
-              <a:t>08-07-2022</a:t>
+              <a:t>09-07-2022</a:t>
             </a:fld>
             <a:endParaRPr lang="es-CL"/>
           </a:p>
@@ -13419,7 +13419,12 @@
             <p:ph type="title"/>
           </p:nvPr>
         </p:nvSpPr>
-        <p:spPr/>
+        <p:spPr>
+          <a:xfrm>
+            <a:off x="4696377" y="-149905"/>
+            <a:ext cx="9905998" cy="1478570"/>
+          </a:xfrm>
+        </p:spPr>
         <p:txBody>
           <a:bodyPr/>
           <a:lstStyle/>
@@ -13447,9 +13452,16 @@
             <p:ph idx="1"/>
           </p:nvPr>
         </p:nvSpPr>
-        <p:spPr/>
+        <p:spPr>
+          <a:xfrm>
+            <a:off x="1141413" y="989854"/>
+            <a:ext cx="9905999" cy="4197966"/>
+          </a:xfrm>
+        </p:spPr>
         <p:txBody>
-          <a:bodyPr/>
+          <a:bodyPr>
+            <a:normAutofit/>
+          </a:bodyPr>
           <a:lstStyle/>
           <a:p>
             <a:r>
@@ -13473,9 +13485,27 @@
             <a:endParaRPr lang="es-CL" dirty="0"/>
           </a:p>
           <a:p>
+            <a:endParaRPr lang="es-CL" dirty="0"/>
+          </a:p>
+          <a:p>
+            <a:endParaRPr lang="es-CL" dirty="0"/>
+          </a:p>
+          <a:p>
+            <a:endParaRPr lang="es-CL" dirty="0"/>
+          </a:p>
+          <a:p>
+            <a:endParaRPr lang="es-CL" dirty="0"/>
+          </a:p>
+          <a:p>
+            <a:endParaRPr lang="es-CL" dirty="0"/>
+          </a:p>
+          <a:p>
+            <a:pPr marL="0" indent="0">
+              <a:buNone/>
+            </a:pPr>
             <a:r>
               <a:rPr lang="es-CL" dirty="0"/>
-              <a:t>Link </a:t>
+              <a:t> Link </a:t>
             </a:r>
             <a:r>
               <a:rPr lang="es-CL" dirty="0" err="1"/>
@@ -13488,6 +13518,66 @@
           </a:p>
         </p:txBody>
       </p:sp>
+      <p:pic>
+        <p:nvPicPr>
+          <p:cNvPr id="5" name="Imagen 4">
+            <a:extLst>
+              <a:ext uri="{FF2B5EF4-FFF2-40B4-BE49-F238E27FC236}">
+                <a16:creationId xmlns:a16="http://schemas.microsoft.com/office/drawing/2014/main" id="{F6F4181B-E67D-E117-8ADF-D96D76884576}"/>
+              </a:ext>
+            </a:extLst>
+          </p:cNvPr>
+          <p:cNvPicPr>
+            <a:picLocks noChangeAspect="1"/>
+          </p:cNvPicPr>
+          <p:nvPr/>
+        </p:nvPicPr>
+        <p:blipFill>
+          <a:blip r:embed="rId3"/>
+          <a:stretch>
+            <a:fillRect/>
+          </a:stretch>
+        </p:blipFill>
+        <p:spPr>
+          <a:xfrm>
+            <a:off x="3052271" y="1667475"/>
+            <a:ext cx="5143846" cy="2830021"/>
+          </a:xfrm>
+          <a:prstGeom prst="rect">
+            <a:avLst/>
+          </a:prstGeom>
+        </p:spPr>
+      </p:pic>
+      <p:pic>
+        <p:nvPicPr>
+          <p:cNvPr id="7" name="Imagen 6">
+            <a:extLst>
+              <a:ext uri="{FF2B5EF4-FFF2-40B4-BE49-F238E27FC236}">
+                <a16:creationId xmlns:a16="http://schemas.microsoft.com/office/drawing/2014/main" id="{E8A98C62-27C3-1EC5-9664-5FF1E990A7FE}"/>
+              </a:ext>
+            </a:extLst>
+          </p:cNvPr>
+          <p:cNvPicPr>
+            <a:picLocks noChangeAspect="1"/>
+          </p:cNvPicPr>
+          <p:nvPr/>
+        </p:nvPicPr>
+        <p:blipFill>
+          <a:blip r:embed="rId4"/>
+          <a:stretch>
+            <a:fillRect/>
+          </a:stretch>
+        </p:blipFill>
+        <p:spPr>
+          <a:xfrm>
+            <a:off x="3326700" y="4872343"/>
+            <a:ext cx="4594989" cy="1860842"/>
+          </a:xfrm>
+          <a:prstGeom prst="rect">
+            <a:avLst/>
+          </a:prstGeom>
+        </p:spPr>
+      </p:pic>
     </p:spTree>
     <p:extLst>
       <p:ext uri="{BB962C8B-B14F-4D97-AF65-F5344CB8AC3E}">

</xml_diff>